<commit_message>
Change runner creation in Tag-2_3 slides
</commit_message>
<xml_diff>
--- a/slides/Tag-2_3-GitLab-Runner.pptx
+++ b/slides/Tag-2_3-GitLab-Runner.pptx
@@ -34,7 +34,7 @@
     <p:sldId id="612" r:id="rId22"/>
     <p:sldId id="608" r:id="rId23"/>
     <p:sldId id="609" r:id="rId24"/>
-    <p:sldId id="611" r:id="rId25"/>
+    <p:sldId id="729" r:id="rId25"/>
     <p:sldId id="610" r:id="rId26"/>
     <p:sldId id="613" r:id="rId27"/>
     <p:sldId id="615" r:id="rId28"/>
@@ -16679,40 +16679,32 @@
             </a:pPr>
             <a:r>
               <a:rPr lang="de-DE" sz="2000" dirty="0"/>
-              <a:t>Linux: </a:t>
+              <a:t>Auf </a:t>
             </a:r>
             <a:r>
               <a:rPr lang="de-DE" sz="2000" dirty="0" err="1"/>
-              <a:t>sudo</a:t>
+              <a:t>GitLab</a:t>
             </a:r>
             <a:r>
               <a:rPr lang="de-DE" sz="2000" dirty="0"/>
-              <a:t> </a:t>
-            </a:r>
-            <a:r>
-              <a:rPr lang="de-DE" sz="2000" dirty="0" err="1"/>
-              <a:t>gitlab-runner</a:t>
-            </a:r>
-            <a:r>
-              <a:rPr lang="de-DE" sz="2000" dirty="0"/>
-              <a:t> </a:t>
-            </a:r>
-            <a:r>
-              <a:rPr lang="de-DE" sz="2000" dirty="0" err="1"/>
-              <a:t>register</a:t>
-            </a:r>
-            <a:br>
-              <a:rPr lang="de-DE" sz="2000" dirty="0"/>
-            </a:br>
-            <a:r>
-              <a:rPr lang="de-DE" sz="2000" dirty="0"/>
-              <a:t>Windows: ./gitlab-runner.exe </a:t>
-            </a:r>
-            <a:r>
-              <a:rPr lang="de-DE" sz="2000" dirty="0" err="1"/>
-              <a:t>register</a:t>
-            </a:r>
-            <a:endParaRPr lang="de-DE" sz="2000" dirty="0"/>
+              <a:t> zu CI/CD Runner Einstellungen wechseln</a:t>
+            </a:r>
+          </a:p>
+          <a:p>
+            <a:pPr marL="857250" lvl="1" indent="-457200">
+              <a:buFont typeface="+mj-lt"/>
+              <a:buAutoNum type="arabicPeriod"/>
+            </a:pPr>
+            <a:r>
+              <a:rPr lang="de-DE" sz="1800" dirty="0"/>
+              <a:t>Projekt </a:t>
+            </a:r>
+            <a:r>
+              <a:rPr lang="de-DE" sz="1800" dirty="0">
+                <a:sym typeface="Wingdings" panose="05000000000000000000" pitchFamily="2" charset="2"/>
+              </a:rPr>
+              <a:t> Einstellungen  CI/CD  Runners</a:t>
+            </a:r>
           </a:p>
           <a:p>
             <a:pPr marL="457200" indent="-457200">
@@ -16720,16 +16712,34 @@
               <a:buAutoNum type="arabicPeriod"/>
             </a:pPr>
             <a:r>
-              <a:rPr lang="de-DE" sz="2000" dirty="0"/>
-              <a:t>URL zur </a:t>
-            </a:r>
-            <a:r>
-              <a:rPr lang="de-DE" sz="2000" dirty="0" err="1"/>
-              <a:t>GitLab</a:t>
-            </a:r>
-            <a:r>
-              <a:rPr lang="de-DE" sz="2000" dirty="0"/>
-              <a:t> Instanz eingeben</a:t>
+              <a:rPr lang="de-DE" sz="2000" dirty="0">
+                <a:sym typeface="Wingdings" panose="05000000000000000000" pitchFamily="2" charset="2"/>
+              </a:rPr>
+              <a:t>Unter Project Runners auf „New </a:t>
+            </a:r>
+            <a:r>
+              <a:rPr lang="de-DE" sz="2000" dirty="0" err="1">
+                <a:sym typeface="Wingdings" panose="05000000000000000000" pitchFamily="2" charset="2"/>
+              </a:rPr>
+              <a:t>project</a:t>
+            </a:r>
+            <a:r>
+              <a:rPr lang="de-DE" sz="2000" dirty="0">
+                <a:sym typeface="Wingdings" panose="05000000000000000000" pitchFamily="2" charset="2"/>
+              </a:rPr>
+              <a:t> </a:t>
+            </a:r>
+            <a:r>
+              <a:rPr lang="de-DE" sz="2000" dirty="0" err="1">
+                <a:sym typeface="Wingdings" panose="05000000000000000000" pitchFamily="2" charset="2"/>
+              </a:rPr>
+              <a:t>runner</a:t>
+            </a:r>
+            <a:r>
+              <a:rPr lang="de-DE" sz="2000" dirty="0">
+                <a:sym typeface="Wingdings" panose="05000000000000000000" pitchFamily="2" charset="2"/>
+              </a:rPr>
+              <a:t>“ Button klicken</a:t>
             </a:r>
           </a:p>
           <a:p>
@@ -16738,24 +16748,10 @@
               <a:buAutoNum type="arabicPeriod"/>
             </a:pPr>
             <a:r>
-              <a:rPr lang="de-DE" sz="2000" dirty="0"/>
-              <a:t>Authenticator-Token für den Runner eingeben</a:t>
-            </a:r>
-          </a:p>
-          <a:p>
-            <a:pPr marL="857250" lvl="1" indent="-457200">
-              <a:buFont typeface="+mj-lt"/>
-              <a:buAutoNum type="arabicPeriod"/>
-            </a:pPr>
-            <a:r>
-              <a:rPr lang="de-DE" sz="1800" dirty="0"/>
-              <a:t>Projekt </a:t>
-            </a:r>
-            <a:r>
-              <a:rPr lang="de-DE" sz="1800" dirty="0">
+              <a:rPr lang="de-DE" sz="2000" dirty="0">
                 <a:sym typeface="Wingdings" panose="05000000000000000000" pitchFamily="2" charset="2"/>
               </a:rPr>
-              <a:t> Einstellungen  CI/CD  Runners</a:t>
+              <a:t>Tags und Konfiguration für den Runner eingeben (später über die GUI änderbar)</a:t>
             </a:r>
           </a:p>
           <a:p>
@@ -16764,10 +16760,16 @@
               <a:buAutoNum type="arabicPeriod"/>
             </a:pPr>
             <a:r>
-              <a:rPr lang="de-DE" sz="2000" dirty="0">
-                <a:sym typeface="Wingdings" panose="05000000000000000000" pitchFamily="2" charset="2"/>
-              </a:rPr>
-              <a:t>Beschreibung für den Runner eingeben (später über die GUI änderbar)</a:t>
+              <a:rPr lang="de-DE" sz="2000" dirty="0"/>
+              <a:t>Runner über „Create </a:t>
+            </a:r>
+            <a:r>
+              <a:rPr lang="de-DE" sz="2000" dirty="0" err="1"/>
+              <a:t>runner</a:t>
+            </a:r>
+            <a:r>
+              <a:rPr lang="de-DE" sz="2000" dirty="0"/>
+              <a:t>“ erstellen </a:t>
             </a:r>
           </a:p>
           <a:p>
@@ -16777,15 +16779,7 @@
             </a:pPr>
             <a:r>
               <a:rPr lang="de-DE" sz="2000" dirty="0"/>
-              <a:t>Die entsprechenden Tags für den </a:t>
-            </a:r>
-            <a:r>
-              <a:rPr lang="de-DE" sz="2000" dirty="0" err="1"/>
-              <a:t>GitLab</a:t>
-            </a:r>
-            <a:r>
-              <a:rPr lang="de-DE" sz="2000" dirty="0"/>
-              <a:t> Runner</a:t>
+              <a:t>Plattform für Runner auswählen und gegeben Command im Terminal ausführen</a:t>
             </a:r>
           </a:p>
           <a:p>
@@ -16794,12 +16788,16 @@
               <a:buAutoNum type="arabicPeriod"/>
             </a:pPr>
             <a:r>
+              <a:rPr lang="de-DE" sz="2000" dirty="0"/>
+              <a:t>In Konsole Konfiguration und </a:t>
+            </a:r>
+            <a:r>
               <a:rPr lang="de-DE" sz="2000" dirty="0" err="1"/>
               <a:t>Executor</a:t>
             </a:r>
             <a:r>
               <a:rPr lang="de-DE" sz="2000" dirty="0"/>
-              <a:t> (Shell, Docker, …) für den Runner angeben</a:t>
+              <a:t> auswählen (Shell, Docker, …)</a:t>
             </a:r>
           </a:p>
           <a:p>
@@ -16835,7 +16833,32 @@
               <a:buFont typeface="+mj-lt"/>
               <a:buAutoNum type="arabicPeriod"/>
             </a:pPr>
-            <a:endParaRPr lang="de-DE" sz="1600" dirty="0"/>
+            <a:r>
+              <a:rPr lang="de-DE" sz="2000" dirty="0"/>
+              <a:t>Optional: Runner mittels </a:t>
+            </a:r>
+            <a:r>
+              <a:rPr lang="de-DE" sz="2000" dirty="0" err="1">
+                <a:latin typeface="Consolas" panose="020B0609020204030204" pitchFamily="49" charset="0"/>
+              </a:rPr>
+              <a:t>gitlab-runner</a:t>
+            </a:r>
+            <a:r>
+              <a:rPr lang="de-DE" sz="2000" dirty="0">
+                <a:latin typeface="Consolas" panose="020B0609020204030204" pitchFamily="49" charset="0"/>
+              </a:rPr>
+              <a:t> </a:t>
+            </a:r>
+            <a:r>
+              <a:rPr lang="de-DE" sz="2000" dirty="0" err="1">
+                <a:latin typeface="Consolas" panose="020B0609020204030204" pitchFamily="49" charset="0"/>
+              </a:rPr>
+              <a:t>run</a:t>
+            </a:r>
+            <a:r>
+              <a:rPr lang="de-DE" sz="2000" dirty="0"/>
+              <a:t> verifizieren </a:t>
+            </a:r>
           </a:p>
           <a:p>
             <a:pPr marL="457200" indent="-457200">
@@ -16867,7 +16890,7 @@
     </p:spTree>
     <p:extLst>
       <p:ext uri="{BB962C8B-B14F-4D97-AF65-F5344CB8AC3E}">
-        <p14:creationId xmlns:p14="http://schemas.microsoft.com/office/powerpoint/2010/main" val="34263816"/>
+        <p14:creationId xmlns:p14="http://schemas.microsoft.com/office/powerpoint/2010/main" val="413778600"/>
       </p:ext>
     </p:extLst>
   </p:cSld>

</xml_diff>

<commit_message>
"Einstellungen" zu "Settings" geändert
</commit_message>
<xml_diff>
--- a/slides/Tag-2_3-GitLab-Runner.pptx
+++ b/slides/Tag-2_3-GitLab-Runner.pptx
@@ -16700,10 +16700,16 @@
               <a:t>Projekt </a:t>
             </a:r>
             <a:r>
+              <a:rPr lang="de-DE" sz="1800">
+                <a:sym typeface="Wingdings" panose="05000000000000000000" pitchFamily="2" charset="2"/>
+              </a:rPr>
+              <a:t> Settings </a:t>
+            </a:r>
+            <a:r>
               <a:rPr lang="de-DE" sz="1800" dirty="0">
                 <a:sym typeface="Wingdings" panose="05000000000000000000" pitchFamily="2" charset="2"/>
               </a:rPr>
-              <a:t> Einstellungen  CI/CD  Runners</a:t>
+              <a:t> CI/CD  Runners</a:t>
             </a:r>
           </a:p>
           <a:p>

</xml_diff>

<commit_message>
HECKER CONSULTING Logo auf PUngewiß-slides eingebaut (über Folienmaster)
</commit_message>
<xml_diff>
--- a/slides/Tag-2_3-GitLab-Runner.pptx
+++ b/slides/Tag-2_3-GitLab-Runner.pptx
@@ -11068,6 +11068,42 @@
           </a:p>
         </p:txBody>
       </p:sp>
+      <p:pic>
+        <p:nvPicPr>
+          <p:cNvPr id="3" name="Grafik 2">
+            <a:extLst>
+              <a:ext uri="{FF2B5EF4-FFF2-40B4-BE49-F238E27FC236}">
+                <a16:creationId xmlns:a16="http://schemas.microsoft.com/office/drawing/2014/main" id="{B5A7B44C-FE4F-E69F-D17E-F407083FAE78}"/>
+              </a:ext>
+            </a:extLst>
+          </p:cNvPr>
+          <p:cNvPicPr>
+            <a:picLocks noChangeAspect="1"/>
+          </p:cNvPicPr>
+          <p:nvPr userDrawn="1"/>
+        </p:nvPicPr>
+        <p:blipFill>
+          <a:blip r:embed="rId7">
+            <a:extLst>
+              <a:ext uri="{28A0092B-C50C-407E-A947-70E740481C1C}">
+                <a14:useLocalDpi xmlns:a14="http://schemas.microsoft.com/office/drawing/2010/main" val="0"/>
+              </a:ext>
+            </a:extLst>
+          </a:blip>
+          <a:stretch>
+            <a:fillRect/>
+          </a:stretch>
+        </p:blipFill>
+        <p:spPr>
+          <a:xfrm>
+            <a:off x="8486775" y="-15729"/>
+            <a:ext cx="636272" cy="636272"/>
+          </a:xfrm>
+          <a:prstGeom prst="rect">
+            <a:avLst/>
+          </a:prstGeom>
+        </p:spPr>
+      </p:pic>
     </p:spTree>
   </p:cSld>
   <p:clrMap bg1="lt1" tx1="dk1" bg2="lt2" tx2="dk2" accent1="accent1" accent2="accent2" accent3="accent3" accent4="accent4" accent5="accent5" accent6="accent6" hlink="hlink" folHlink="folHlink"/>
@@ -11777,6 +11813,42 @@
           </a:p>
         </p:txBody>
       </p:sp>
+      <p:pic>
+        <p:nvPicPr>
+          <p:cNvPr id="2" name="Grafik 1">
+            <a:extLst>
+              <a:ext uri="{FF2B5EF4-FFF2-40B4-BE49-F238E27FC236}">
+                <a16:creationId xmlns:a16="http://schemas.microsoft.com/office/drawing/2014/main" id="{C038212E-9F17-C17B-0B54-33B80674E401}"/>
+              </a:ext>
+            </a:extLst>
+          </p:cNvPr>
+          <p:cNvPicPr>
+            <a:picLocks noChangeAspect="1"/>
+          </p:cNvPicPr>
+          <p:nvPr userDrawn="1"/>
+        </p:nvPicPr>
+        <p:blipFill>
+          <a:blip r:embed="rId5">
+            <a:extLst>
+              <a:ext uri="{28A0092B-C50C-407E-A947-70E740481C1C}">
+                <a14:useLocalDpi xmlns:a14="http://schemas.microsoft.com/office/drawing/2010/main" val="0"/>
+              </a:ext>
+            </a:extLst>
+          </a:blip>
+          <a:stretch>
+            <a:fillRect/>
+          </a:stretch>
+        </p:blipFill>
+        <p:spPr>
+          <a:xfrm>
+            <a:off x="3383868" y="4481736"/>
+            <a:ext cx="2376264" cy="2376264"/>
+          </a:xfrm>
+          <a:prstGeom prst="rect">
+            <a:avLst/>
+          </a:prstGeom>
+        </p:spPr>
+      </p:pic>
     </p:spTree>
   </p:cSld>
   <p:clrMap bg1="lt1" tx1="dk1" bg2="lt2" tx2="dk2" accent1="accent1" accent2="accent2" accent3="accent3" accent4="accent4" accent5="accent5" accent6="accent6" hlink="hlink" folHlink="folHlink"/>

</xml_diff>